<commit_message>
slight correction on mid-term ppt
</commit_message>
<xml_diff>
--- a/discussion/中間発表.pptx
+++ b/discussion/中間発表.pptx
@@ -3516,42 +3516,42 @@
                 <a:gridCol w="840172">
                   <a:extLst>
                     <a:ext uri="{9D8B030D-6E8A-4147-A177-3AD203B41FA5}">
-                      <a16:colId xmlns:a16="http://schemas.microsoft.com/office/drawing/2014/main" val="20000"/>
+                      <a16:colId xmlns:a16="http://schemas.microsoft.com/office/drawing/2014/main" xmlns="" val="20000"/>
                     </a:ext>
                   </a:extLst>
                 </a:gridCol>
                 <a:gridCol w="840172">
                   <a:extLst>
                     <a:ext uri="{9D8B030D-6E8A-4147-A177-3AD203B41FA5}">
-                      <a16:colId xmlns:a16="http://schemas.microsoft.com/office/drawing/2014/main" val="20001"/>
+                      <a16:colId xmlns:a16="http://schemas.microsoft.com/office/drawing/2014/main" xmlns="" val="20001"/>
                     </a:ext>
                   </a:extLst>
                 </a:gridCol>
                 <a:gridCol w="840172">
                   <a:extLst>
                     <a:ext uri="{9D8B030D-6E8A-4147-A177-3AD203B41FA5}">
-                      <a16:colId xmlns:a16="http://schemas.microsoft.com/office/drawing/2014/main" val="20002"/>
+                      <a16:colId xmlns:a16="http://schemas.microsoft.com/office/drawing/2014/main" xmlns="" val="20002"/>
                     </a:ext>
                   </a:extLst>
                 </a:gridCol>
                 <a:gridCol w="840172">
                   <a:extLst>
                     <a:ext uri="{9D8B030D-6E8A-4147-A177-3AD203B41FA5}">
-                      <a16:colId xmlns:a16="http://schemas.microsoft.com/office/drawing/2014/main" val="20003"/>
+                      <a16:colId xmlns:a16="http://schemas.microsoft.com/office/drawing/2014/main" xmlns="" val="20003"/>
                     </a:ext>
                   </a:extLst>
                 </a:gridCol>
                 <a:gridCol w="840172">
                   <a:extLst>
                     <a:ext uri="{9D8B030D-6E8A-4147-A177-3AD203B41FA5}">
-                      <a16:colId xmlns:a16="http://schemas.microsoft.com/office/drawing/2014/main" val="20004"/>
+                      <a16:colId xmlns:a16="http://schemas.microsoft.com/office/drawing/2014/main" xmlns="" val="20004"/>
                     </a:ext>
                   </a:extLst>
                 </a:gridCol>
                 <a:gridCol w="1468418">
                   <a:extLst>
                     <a:ext uri="{9D8B030D-6E8A-4147-A177-3AD203B41FA5}">
-                      <a16:colId xmlns:a16="http://schemas.microsoft.com/office/drawing/2014/main" val="20005"/>
+                      <a16:colId xmlns:a16="http://schemas.microsoft.com/office/drawing/2014/main" xmlns="" val="20005"/>
                     </a:ext>
                   </a:extLst>
                 </a:gridCol>
@@ -3841,7 +3841,7 @@
                 </a:tc>
                 <a:extLst>
                   <a:ext uri="{0D108BD9-81ED-4DB2-BD59-A6C34878D82A}">
-                    <a16:rowId xmlns:a16="http://schemas.microsoft.com/office/drawing/2014/main" val="10000"/>
+                    <a16:rowId xmlns:a16="http://schemas.microsoft.com/office/drawing/2014/main" xmlns="" val="10000"/>
                   </a:ext>
                 </a:extLst>
               </a:tr>
@@ -4130,7 +4130,7 @@
                 </a:tc>
                 <a:extLst>
                   <a:ext uri="{0D108BD9-81ED-4DB2-BD59-A6C34878D82A}">
-                    <a16:rowId xmlns:a16="http://schemas.microsoft.com/office/drawing/2014/main" val="10001"/>
+                    <a16:rowId xmlns:a16="http://schemas.microsoft.com/office/drawing/2014/main" xmlns="" val="10001"/>
                   </a:ext>
                 </a:extLst>
               </a:tr>
@@ -8162,8 +8162,8 @@
           </a:p>
         </p:txBody>
       </p:sp>
-      <mc:AlternateContent xmlns:mc="http://schemas.openxmlformats.org/markup-compatibility/2006">
-        <mc:Choice xmlns:a14="http://schemas.microsoft.com/office/drawing/2010/main" Requires="a14">
+      <mc:AlternateContent xmlns:mc="http://schemas.openxmlformats.org/markup-compatibility/2006" xmlns:a14="http://schemas.microsoft.com/office/drawing/2010/main">
+        <mc:Choice Requires="a14">
           <p:sp>
             <p:nvSpPr>
               <p:cNvPr id="7" name="テキスト ボックス 6"/>
@@ -8493,7 +8493,7 @@
             </p:txBody>
           </p:sp>
         </mc:Choice>
-        <mc:Fallback>
+        <mc:Fallback xmlns="">
           <p:sp>
             <p:nvSpPr>
               <p:cNvPr id="7" name="テキスト ボックス 6"/>
@@ -9578,6 +9578,62 @@
           </a:p>
         </p:txBody>
       </p:sp>
+      <p:sp>
+        <p:nvSpPr>
+          <p:cNvPr id="2" name="テキスト ボックス 1"/>
+          <p:cNvSpPr txBox="1"/>
+          <p:nvPr/>
+        </p:nvSpPr>
+        <p:spPr>
+          <a:xfrm>
+            <a:off x="5760580" y="2227323"/>
+            <a:ext cx="2278060" cy="523220"/>
+          </a:xfrm>
+          <a:prstGeom prst="rect">
+            <a:avLst/>
+          </a:prstGeom>
+          <a:noFill/>
+        </p:spPr>
+        <p:txBody>
+          <a:bodyPr wrap="none" rtlCol="0">
+            <a:spAutoFit/>
+          </a:bodyPr>
+          <a:lstStyle/>
+          <a:p>
+            <a:r>
+              <a:rPr lang="ja-JP" altLang="en-US" sz="1400" dirty="0" smtClean="0"/>
+              <a:t>（使用プログラム </a:t>
+            </a:r>
+            <a:r>
+              <a:rPr lang="en-US" altLang="ja-JP" sz="1400" dirty="0" smtClean="0"/>
+              <a:t>:</a:t>
+            </a:r>
+          </a:p>
+          <a:p>
+            <a:r>
+              <a:rPr lang="en-US" altLang="ja-JP" sz="1400" dirty="0"/>
+              <a:t>	</a:t>
+            </a:r>
+            <a:r>
+              <a:rPr lang="en-US" altLang="ja-JP" sz="1400" dirty="0" err="1" smtClean="0"/>
+              <a:t>AutoDock</a:t>
+            </a:r>
+            <a:r>
+              <a:rPr lang="en-US" altLang="ja-JP" sz="1400" dirty="0" smtClean="0"/>
+              <a:t> </a:t>
+            </a:r>
+            <a:r>
+              <a:rPr lang="en-US" altLang="ja-JP" sz="1400" dirty="0" err="1" smtClean="0"/>
+              <a:t>Vina</a:t>
+            </a:r>
+            <a:r>
+              <a:rPr lang="ja-JP" altLang="en-US" sz="1400" dirty="0" smtClean="0"/>
+              <a:t>）</a:t>
+            </a:r>
+            <a:endParaRPr kumimoji="1" lang="ja-JP" altLang="en-US" sz="1400" dirty="0"/>
+          </a:p>
+        </p:txBody>
+      </p:sp>
     </p:spTree>
     <p:extLst>
       <p:ext uri="{BB962C8B-B14F-4D97-AF65-F5344CB8AC3E}">
@@ -9679,14 +9735,14 @@
                 <a:gridCol w="4168345">
                   <a:extLst>
                     <a:ext uri="{9D8B030D-6E8A-4147-A177-3AD203B41FA5}">
-                      <a16:colId xmlns:a16="http://schemas.microsoft.com/office/drawing/2014/main" val="20000"/>
+                      <a16:colId xmlns:a16="http://schemas.microsoft.com/office/drawing/2014/main" xmlns="" val="20000"/>
                     </a:ext>
                   </a:extLst>
                 </a:gridCol>
                 <a:gridCol w="4168345">
                   <a:extLst>
                     <a:ext uri="{9D8B030D-6E8A-4147-A177-3AD203B41FA5}">
-                      <a16:colId xmlns:a16="http://schemas.microsoft.com/office/drawing/2014/main" val="20001"/>
+                      <a16:colId xmlns:a16="http://schemas.microsoft.com/office/drawing/2014/main" xmlns="" val="20001"/>
                     </a:ext>
                   </a:extLst>
                 </a:gridCol>
@@ -9733,7 +9789,7 @@
                 </a:tc>
                 <a:extLst>
                   <a:ext uri="{0D108BD9-81ED-4DB2-BD59-A6C34878D82A}">
-                    <a16:rowId xmlns:a16="http://schemas.microsoft.com/office/drawing/2014/main" val="10000"/>
+                    <a16:rowId xmlns:a16="http://schemas.microsoft.com/office/drawing/2014/main" xmlns="" val="10000"/>
                   </a:ext>
                 </a:extLst>
               </a:tr>
@@ -9765,7 +9821,7 @@
                 </a:tc>
                 <a:extLst>
                   <a:ext uri="{0D108BD9-81ED-4DB2-BD59-A6C34878D82A}">
-                    <a16:rowId xmlns:a16="http://schemas.microsoft.com/office/drawing/2014/main" val="10001"/>
+                    <a16:rowId xmlns:a16="http://schemas.microsoft.com/office/drawing/2014/main" xmlns="" val="10001"/>
                   </a:ext>
                 </a:extLst>
               </a:tr>
@@ -9797,7 +9853,7 @@
                 </a:tc>
                 <a:extLst>
                   <a:ext uri="{0D108BD9-81ED-4DB2-BD59-A6C34878D82A}">
-                    <a16:rowId xmlns:a16="http://schemas.microsoft.com/office/drawing/2014/main" val="10002"/>
+                    <a16:rowId xmlns:a16="http://schemas.microsoft.com/office/drawing/2014/main" xmlns="" val="10002"/>
                   </a:ext>
                 </a:extLst>
               </a:tr>
@@ -9829,7 +9885,7 @@
                 </a:tc>
                 <a:extLst>
                   <a:ext uri="{0D108BD9-81ED-4DB2-BD59-A6C34878D82A}">
-                    <a16:rowId xmlns:a16="http://schemas.microsoft.com/office/drawing/2014/main" val="10003"/>
+                    <a16:rowId xmlns:a16="http://schemas.microsoft.com/office/drawing/2014/main" xmlns="" val="10003"/>
                   </a:ext>
                 </a:extLst>
               </a:tr>
@@ -9861,7 +9917,7 @@
                 </a:tc>
                 <a:extLst>
                   <a:ext uri="{0D108BD9-81ED-4DB2-BD59-A6C34878D82A}">
-                    <a16:rowId xmlns:a16="http://schemas.microsoft.com/office/drawing/2014/main" val="10004"/>
+                    <a16:rowId xmlns:a16="http://schemas.microsoft.com/office/drawing/2014/main" xmlns="" val="10004"/>
                   </a:ext>
                 </a:extLst>
               </a:tr>
@@ -9893,7 +9949,7 @@
                 </a:tc>
                 <a:extLst>
                   <a:ext uri="{0D108BD9-81ED-4DB2-BD59-A6C34878D82A}">
-                    <a16:rowId xmlns:a16="http://schemas.microsoft.com/office/drawing/2014/main" val="10005"/>
+                    <a16:rowId xmlns:a16="http://schemas.microsoft.com/office/drawing/2014/main" xmlns="" val="10005"/>
                   </a:ext>
                 </a:extLst>
               </a:tr>
@@ -9925,7 +9981,7 @@
                 </a:tc>
                 <a:extLst>
                   <a:ext uri="{0D108BD9-81ED-4DB2-BD59-A6C34878D82A}">
-                    <a16:rowId xmlns:a16="http://schemas.microsoft.com/office/drawing/2014/main" val="10006"/>
+                    <a16:rowId xmlns:a16="http://schemas.microsoft.com/office/drawing/2014/main" xmlns="" val="10006"/>
                   </a:ext>
                 </a:extLst>
               </a:tr>
@@ -9957,7 +10013,7 @@
                 </a:tc>
                 <a:extLst>
                   <a:ext uri="{0D108BD9-81ED-4DB2-BD59-A6C34878D82A}">
-                    <a16:rowId xmlns:a16="http://schemas.microsoft.com/office/drawing/2014/main" val="10007"/>
+                    <a16:rowId xmlns:a16="http://schemas.microsoft.com/office/drawing/2014/main" xmlns="" val="10007"/>
                   </a:ext>
                 </a:extLst>
               </a:tr>
@@ -9989,7 +10045,7 @@
                 </a:tc>
                 <a:extLst>
                   <a:ext uri="{0D108BD9-81ED-4DB2-BD59-A6C34878D82A}">
-                    <a16:rowId xmlns:a16="http://schemas.microsoft.com/office/drawing/2014/main" val="10008"/>
+                    <a16:rowId xmlns:a16="http://schemas.microsoft.com/office/drawing/2014/main" xmlns="" val="10008"/>
                   </a:ext>
                 </a:extLst>
               </a:tr>
@@ -10021,7 +10077,7 @@
                 </a:tc>
                 <a:extLst>
                   <a:ext uri="{0D108BD9-81ED-4DB2-BD59-A6C34878D82A}">
-                    <a16:rowId xmlns:a16="http://schemas.microsoft.com/office/drawing/2014/main" val="10009"/>
+                    <a16:rowId xmlns:a16="http://schemas.microsoft.com/office/drawing/2014/main" xmlns="" val="10009"/>
                   </a:ext>
                 </a:extLst>
               </a:tr>
@@ -10053,7 +10109,7 @@
                 </a:tc>
                 <a:extLst>
                   <a:ext uri="{0D108BD9-81ED-4DB2-BD59-A6C34878D82A}">
-                    <a16:rowId xmlns:a16="http://schemas.microsoft.com/office/drawing/2014/main" val="10010"/>
+                    <a16:rowId xmlns:a16="http://schemas.microsoft.com/office/drawing/2014/main" xmlns="" val="10010"/>
                   </a:ext>
                 </a:extLst>
               </a:tr>
@@ -10834,6 +10890,62 @@
               <a:ea typeface="Hiragino Kaku Gothic Pro W6" charset="-128"/>
               <a:cs typeface="Hiragino Kaku Gothic Pro W6" charset="-128"/>
             </a:endParaRPr>
+          </a:p>
+        </p:txBody>
+      </p:sp>
+      <p:sp>
+        <p:nvSpPr>
+          <p:cNvPr id="13" name="テキスト ボックス 12"/>
+          <p:cNvSpPr txBox="1"/>
+          <p:nvPr/>
+        </p:nvSpPr>
+        <p:spPr>
+          <a:xfrm>
+            <a:off x="5760580" y="2227323"/>
+            <a:ext cx="2278060" cy="523220"/>
+          </a:xfrm>
+          <a:prstGeom prst="rect">
+            <a:avLst/>
+          </a:prstGeom>
+          <a:noFill/>
+        </p:spPr>
+        <p:txBody>
+          <a:bodyPr wrap="none" rtlCol="0">
+            <a:spAutoFit/>
+          </a:bodyPr>
+          <a:lstStyle/>
+          <a:p>
+            <a:r>
+              <a:rPr lang="ja-JP" altLang="en-US" sz="1400" dirty="0" smtClean="0"/>
+              <a:t>（使用プログラム </a:t>
+            </a:r>
+            <a:r>
+              <a:rPr lang="en-US" altLang="ja-JP" sz="1400" dirty="0" smtClean="0"/>
+              <a:t>:</a:t>
+            </a:r>
+          </a:p>
+          <a:p>
+            <a:r>
+              <a:rPr lang="en-US" altLang="ja-JP" sz="1400" dirty="0"/>
+              <a:t>	</a:t>
+            </a:r>
+            <a:r>
+              <a:rPr lang="en-US" altLang="ja-JP" sz="1400" dirty="0" err="1" smtClean="0"/>
+              <a:t>AutoDock</a:t>
+            </a:r>
+            <a:r>
+              <a:rPr lang="en-US" altLang="ja-JP" sz="1400" dirty="0" smtClean="0"/>
+              <a:t> </a:t>
+            </a:r>
+            <a:r>
+              <a:rPr lang="en-US" altLang="ja-JP" sz="1400" dirty="0" err="1" smtClean="0"/>
+              <a:t>Vina</a:t>
+            </a:r>
+            <a:r>
+              <a:rPr lang="ja-JP" altLang="en-US" sz="1400" dirty="0" smtClean="0"/>
+              <a:t>）</a:t>
+            </a:r>
+            <a:endParaRPr kumimoji="1" lang="ja-JP" altLang="en-US" sz="1400" dirty="0"/>
           </a:p>
         </p:txBody>
       </p:sp>
@@ -12838,6 +12950,62 @@
           </a:p>
         </p:txBody>
       </p:sp>
+      <p:sp>
+        <p:nvSpPr>
+          <p:cNvPr id="32" name="テキスト ボックス 31"/>
+          <p:cNvSpPr txBox="1"/>
+          <p:nvPr/>
+        </p:nvSpPr>
+        <p:spPr>
+          <a:xfrm>
+            <a:off x="5760580" y="2227323"/>
+            <a:ext cx="2278060" cy="523220"/>
+          </a:xfrm>
+          <a:prstGeom prst="rect">
+            <a:avLst/>
+          </a:prstGeom>
+          <a:noFill/>
+        </p:spPr>
+        <p:txBody>
+          <a:bodyPr wrap="none" rtlCol="0">
+            <a:spAutoFit/>
+          </a:bodyPr>
+          <a:lstStyle/>
+          <a:p>
+            <a:r>
+              <a:rPr lang="ja-JP" altLang="en-US" sz="1400" dirty="0" smtClean="0"/>
+              <a:t>（使用プログラム </a:t>
+            </a:r>
+            <a:r>
+              <a:rPr lang="en-US" altLang="ja-JP" sz="1400" dirty="0" smtClean="0"/>
+              <a:t>:</a:t>
+            </a:r>
+          </a:p>
+          <a:p>
+            <a:r>
+              <a:rPr lang="en-US" altLang="ja-JP" sz="1400" dirty="0"/>
+              <a:t>	</a:t>
+            </a:r>
+            <a:r>
+              <a:rPr lang="en-US" altLang="ja-JP" sz="1400" dirty="0" err="1" smtClean="0"/>
+              <a:t>AutoDock</a:t>
+            </a:r>
+            <a:r>
+              <a:rPr lang="en-US" altLang="ja-JP" sz="1400" dirty="0" smtClean="0"/>
+              <a:t> </a:t>
+            </a:r>
+            <a:r>
+              <a:rPr lang="en-US" altLang="ja-JP" sz="1400" dirty="0" err="1" smtClean="0"/>
+              <a:t>Vina</a:t>
+            </a:r>
+            <a:r>
+              <a:rPr lang="ja-JP" altLang="en-US" sz="1400" dirty="0" smtClean="0"/>
+              <a:t>）</a:t>
+            </a:r>
+            <a:endParaRPr kumimoji="1" lang="ja-JP" altLang="en-US" sz="1400" dirty="0"/>
+          </a:p>
+        </p:txBody>
+      </p:sp>
     </p:spTree>
     <p:extLst>
       <p:ext uri="{BB962C8B-B14F-4D97-AF65-F5344CB8AC3E}">
@@ -12896,14 +13064,14 @@
                 <a:gridCol w="4168345">
                   <a:extLst>
                     <a:ext uri="{9D8B030D-6E8A-4147-A177-3AD203B41FA5}">
-                      <a16:colId xmlns:a16="http://schemas.microsoft.com/office/drawing/2014/main" val="20000"/>
+                      <a16:colId xmlns:a16="http://schemas.microsoft.com/office/drawing/2014/main" xmlns="" val="20000"/>
                     </a:ext>
                   </a:extLst>
                 </a:gridCol>
                 <a:gridCol w="4168345">
                   <a:extLst>
                     <a:ext uri="{9D8B030D-6E8A-4147-A177-3AD203B41FA5}">
-                      <a16:colId xmlns:a16="http://schemas.microsoft.com/office/drawing/2014/main" val="20001"/>
+                      <a16:colId xmlns:a16="http://schemas.microsoft.com/office/drawing/2014/main" xmlns="" val="20001"/>
                     </a:ext>
                   </a:extLst>
                 </a:gridCol>
@@ -12950,7 +13118,7 @@
                 </a:tc>
                 <a:extLst>
                   <a:ext uri="{0D108BD9-81ED-4DB2-BD59-A6C34878D82A}">
-                    <a16:rowId xmlns:a16="http://schemas.microsoft.com/office/drawing/2014/main" val="10000"/>
+                    <a16:rowId xmlns:a16="http://schemas.microsoft.com/office/drawing/2014/main" xmlns="" val="10000"/>
                   </a:ext>
                 </a:extLst>
               </a:tr>
@@ -12985,7 +13153,7 @@
                 </a:tc>
                 <a:extLst>
                   <a:ext uri="{0D108BD9-81ED-4DB2-BD59-A6C34878D82A}">
-                    <a16:rowId xmlns:a16="http://schemas.microsoft.com/office/drawing/2014/main" val="10001"/>
+                    <a16:rowId xmlns:a16="http://schemas.microsoft.com/office/drawing/2014/main" xmlns="" val="10001"/>
                   </a:ext>
                 </a:extLst>
               </a:tr>
@@ -13020,7 +13188,7 @@
                 </a:tc>
                 <a:extLst>
                   <a:ext uri="{0D108BD9-81ED-4DB2-BD59-A6C34878D82A}">
-                    <a16:rowId xmlns:a16="http://schemas.microsoft.com/office/drawing/2014/main" val="10002"/>
+                    <a16:rowId xmlns:a16="http://schemas.microsoft.com/office/drawing/2014/main" xmlns="" val="10002"/>
                   </a:ext>
                 </a:extLst>
               </a:tr>
@@ -13055,7 +13223,7 @@
                 </a:tc>
                 <a:extLst>
                   <a:ext uri="{0D108BD9-81ED-4DB2-BD59-A6C34878D82A}">
-                    <a16:rowId xmlns:a16="http://schemas.microsoft.com/office/drawing/2014/main" val="10003"/>
+                    <a16:rowId xmlns:a16="http://schemas.microsoft.com/office/drawing/2014/main" xmlns="" val="10003"/>
                   </a:ext>
                 </a:extLst>
               </a:tr>
@@ -13163,14 +13331,14 @@
                 <a:gridCol w="4168345">
                   <a:extLst>
                     <a:ext uri="{9D8B030D-6E8A-4147-A177-3AD203B41FA5}">
-                      <a16:colId xmlns:a16="http://schemas.microsoft.com/office/drawing/2014/main" val="20000"/>
+                      <a16:colId xmlns:a16="http://schemas.microsoft.com/office/drawing/2014/main" xmlns="" val="20000"/>
                     </a:ext>
                   </a:extLst>
                 </a:gridCol>
                 <a:gridCol w="4168345">
                   <a:extLst>
                     <a:ext uri="{9D8B030D-6E8A-4147-A177-3AD203B41FA5}">
-                      <a16:colId xmlns:a16="http://schemas.microsoft.com/office/drawing/2014/main" val="20001"/>
+                      <a16:colId xmlns:a16="http://schemas.microsoft.com/office/drawing/2014/main" xmlns="" val="20001"/>
                     </a:ext>
                   </a:extLst>
                 </a:gridCol>
@@ -13217,7 +13385,7 @@
                 </a:tc>
                 <a:extLst>
                   <a:ext uri="{0D108BD9-81ED-4DB2-BD59-A6C34878D82A}">
-                    <a16:rowId xmlns:a16="http://schemas.microsoft.com/office/drawing/2014/main" val="10000"/>
+                    <a16:rowId xmlns:a16="http://schemas.microsoft.com/office/drawing/2014/main" xmlns="" val="10000"/>
                   </a:ext>
                 </a:extLst>
               </a:tr>
@@ -13252,7 +13420,7 @@
                 </a:tc>
                 <a:extLst>
                   <a:ext uri="{0D108BD9-81ED-4DB2-BD59-A6C34878D82A}">
-                    <a16:rowId xmlns:a16="http://schemas.microsoft.com/office/drawing/2014/main" val="10001"/>
+                    <a16:rowId xmlns:a16="http://schemas.microsoft.com/office/drawing/2014/main" xmlns="" val="10001"/>
                   </a:ext>
                 </a:extLst>
               </a:tr>
@@ -13287,7 +13455,7 @@
                 </a:tc>
                 <a:extLst>
                   <a:ext uri="{0D108BD9-81ED-4DB2-BD59-A6C34878D82A}">
-                    <a16:rowId xmlns:a16="http://schemas.microsoft.com/office/drawing/2014/main" val="10002"/>
+                    <a16:rowId xmlns:a16="http://schemas.microsoft.com/office/drawing/2014/main" xmlns="" val="10002"/>
                   </a:ext>
                 </a:extLst>
               </a:tr>
@@ -13322,7 +13490,7 @@
                 </a:tc>
                 <a:extLst>
                   <a:ext uri="{0D108BD9-81ED-4DB2-BD59-A6C34878D82A}">
-                    <a16:rowId xmlns:a16="http://schemas.microsoft.com/office/drawing/2014/main" val="10003"/>
+                    <a16:rowId xmlns:a16="http://schemas.microsoft.com/office/drawing/2014/main" xmlns="" val="10003"/>
                   </a:ext>
                 </a:extLst>
               </a:tr>
@@ -15789,42 +15957,42 @@
                 <a:gridCol w="840172">
                   <a:extLst>
                     <a:ext uri="{9D8B030D-6E8A-4147-A177-3AD203B41FA5}">
-                      <a16:colId xmlns:a16="http://schemas.microsoft.com/office/drawing/2014/main" val="20000"/>
+                      <a16:colId xmlns:a16="http://schemas.microsoft.com/office/drawing/2014/main" xmlns="" val="20000"/>
                     </a:ext>
                   </a:extLst>
                 </a:gridCol>
                 <a:gridCol w="840172">
                   <a:extLst>
                     <a:ext uri="{9D8B030D-6E8A-4147-A177-3AD203B41FA5}">
-                      <a16:colId xmlns:a16="http://schemas.microsoft.com/office/drawing/2014/main" val="20001"/>
+                      <a16:colId xmlns:a16="http://schemas.microsoft.com/office/drawing/2014/main" xmlns="" val="20001"/>
                     </a:ext>
                   </a:extLst>
                 </a:gridCol>
                 <a:gridCol w="840172">
                   <a:extLst>
                     <a:ext uri="{9D8B030D-6E8A-4147-A177-3AD203B41FA5}">
-                      <a16:colId xmlns:a16="http://schemas.microsoft.com/office/drawing/2014/main" val="20002"/>
+                      <a16:colId xmlns:a16="http://schemas.microsoft.com/office/drawing/2014/main" xmlns="" val="20002"/>
                     </a:ext>
                   </a:extLst>
                 </a:gridCol>
                 <a:gridCol w="840172">
                   <a:extLst>
                     <a:ext uri="{9D8B030D-6E8A-4147-A177-3AD203B41FA5}">
-                      <a16:colId xmlns:a16="http://schemas.microsoft.com/office/drawing/2014/main" val="20003"/>
+                      <a16:colId xmlns:a16="http://schemas.microsoft.com/office/drawing/2014/main" xmlns="" val="20003"/>
                     </a:ext>
                   </a:extLst>
                 </a:gridCol>
                 <a:gridCol w="840172">
                   <a:extLst>
                     <a:ext uri="{9D8B030D-6E8A-4147-A177-3AD203B41FA5}">
-                      <a16:colId xmlns:a16="http://schemas.microsoft.com/office/drawing/2014/main" val="20004"/>
+                      <a16:colId xmlns:a16="http://schemas.microsoft.com/office/drawing/2014/main" xmlns="" val="20004"/>
                     </a:ext>
                   </a:extLst>
                 </a:gridCol>
                 <a:gridCol w="1468418">
                   <a:extLst>
                     <a:ext uri="{9D8B030D-6E8A-4147-A177-3AD203B41FA5}">
-                      <a16:colId xmlns:a16="http://schemas.microsoft.com/office/drawing/2014/main" val="20005"/>
+                      <a16:colId xmlns:a16="http://schemas.microsoft.com/office/drawing/2014/main" xmlns="" val="20005"/>
                     </a:ext>
                   </a:extLst>
                 </a:gridCol>
@@ -16114,7 +16282,7 @@
                 </a:tc>
                 <a:extLst>
                   <a:ext uri="{0D108BD9-81ED-4DB2-BD59-A6C34878D82A}">
-                    <a16:rowId xmlns:a16="http://schemas.microsoft.com/office/drawing/2014/main" val="10000"/>
+                    <a16:rowId xmlns:a16="http://schemas.microsoft.com/office/drawing/2014/main" xmlns="" val="10000"/>
                   </a:ext>
                 </a:extLst>
               </a:tr>
@@ -16403,7 +16571,7 @@
                 </a:tc>
                 <a:extLst>
                   <a:ext uri="{0D108BD9-81ED-4DB2-BD59-A6C34878D82A}">
-                    <a16:rowId xmlns:a16="http://schemas.microsoft.com/office/drawing/2014/main" val="10001"/>
+                    <a16:rowId xmlns:a16="http://schemas.microsoft.com/office/drawing/2014/main" xmlns="" val="10001"/>
                   </a:ext>
                 </a:extLst>
               </a:tr>
@@ -16766,42 +16934,42 @@
                 <a:gridCol w="840172">
                   <a:extLst>
                     <a:ext uri="{9D8B030D-6E8A-4147-A177-3AD203B41FA5}">
-                      <a16:colId xmlns:a16="http://schemas.microsoft.com/office/drawing/2014/main" val="20000"/>
+                      <a16:colId xmlns:a16="http://schemas.microsoft.com/office/drawing/2014/main" xmlns="" val="20000"/>
                     </a:ext>
                   </a:extLst>
                 </a:gridCol>
                 <a:gridCol w="840172">
                   <a:extLst>
                     <a:ext uri="{9D8B030D-6E8A-4147-A177-3AD203B41FA5}">
-                      <a16:colId xmlns:a16="http://schemas.microsoft.com/office/drawing/2014/main" val="20001"/>
+                      <a16:colId xmlns:a16="http://schemas.microsoft.com/office/drawing/2014/main" xmlns="" val="20001"/>
                     </a:ext>
                   </a:extLst>
                 </a:gridCol>
                 <a:gridCol w="840172">
                   <a:extLst>
                     <a:ext uri="{9D8B030D-6E8A-4147-A177-3AD203B41FA5}">
-                      <a16:colId xmlns:a16="http://schemas.microsoft.com/office/drawing/2014/main" val="20002"/>
+                      <a16:colId xmlns:a16="http://schemas.microsoft.com/office/drawing/2014/main" xmlns="" val="20002"/>
                     </a:ext>
                   </a:extLst>
                 </a:gridCol>
                 <a:gridCol w="840172">
                   <a:extLst>
                     <a:ext uri="{9D8B030D-6E8A-4147-A177-3AD203B41FA5}">
-                      <a16:colId xmlns:a16="http://schemas.microsoft.com/office/drawing/2014/main" val="20003"/>
+                      <a16:colId xmlns:a16="http://schemas.microsoft.com/office/drawing/2014/main" xmlns="" val="20003"/>
                     </a:ext>
                   </a:extLst>
                 </a:gridCol>
                 <a:gridCol w="840172">
                   <a:extLst>
                     <a:ext uri="{9D8B030D-6E8A-4147-A177-3AD203B41FA5}">
-                      <a16:colId xmlns:a16="http://schemas.microsoft.com/office/drawing/2014/main" val="20004"/>
+                      <a16:colId xmlns:a16="http://schemas.microsoft.com/office/drawing/2014/main" xmlns="" val="20004"/>
                     </a:ext>
                   </a:extLst>
                 </a:gridCol>
                 <a:gridCol w="1468418">
                   <a:extLst>
                     <a:ext uri="{9D8B030D-6E8A-4147-A177-3AD203B41FA5}">
-                      <a16:colId xmlns:a16="http://schemas.microsoft.com/office/drawing/2014/main" val="20005"/>
+                      <a16:colId xmlns:a16="http://schemas.microsoft.com/office/drawing/2014/main" xmlns="" val="20005"/>
                     </a:ext>
                   </a:extLst>
                 </a:gridCol>
@@ -17091,7 +17259,7 @@
                 </a:tc>
                 <a:extLst>
                   <a:ext uri="{0D108BD9-81ED-4DB2-BD59-A6C34878D82A}">
-                    <a16:rowId xmlns:a16="http://schemas.microsoft.com/office/drawing/2014/main" val="10000"/>
+                    <a16:rowId xmlns:a16="http://schemas.microsoft.com/office/drawing/2014/main" xmlns="" val="10000"/>
                   </a:ext>
                 </a:extLst>
               </a:tr>
@@ -17380,7 +17548,7 @@
                 </a:tc>
                 <a:extLst>
                   <a:ext uri="{0D108BD9-81ED-4DB2-BD59-A6C34878D82A}">
-                    <a16:rowId xmlns:a16="http://schemas.microsoft.com/office/drawing/2014/main" val="10001"/>
+                    <a16:rowId xmlns:a16="http://schemas.microsoft.com/office/drawing/2014/main" xmlns="" val="10001"/>
                   </a:ext>
                 </a:extLst>
               </a:tr>
@@ -18697,42 +18865,42 @@
                 <a:gridCol w="840172">
                   <a:extLst>
                     <a:ext uri="{9D8B030D-6E8A-4147-A177-3AD203B41FA5}">
-                      <a16:colId xmlns:a16="http://schemas.microsoft.com/office/drawing/2014/main" val="20000"/>
+                      <a16:colId xmlns:a16="http://schemas.microsoft.com/office/drawing/2014/main" xmlns="" val="20000"/>
                     </a:ext>
                   </a:extLst>
                 </a:gridCol>
                 <a:gridCol w="840172">
                   <a:extLst>
                     <a:ext uri="{9D8B030D-6E8A-4147-A177-3AD203B41FA5}">
-                      <a16:colId xmlns:a16="http://schemas.microsoft.com/office/drawing/2014/main" val="20001"/>
+                      <a16:colId xmlns:a16="http://schemas.microsoft.com/office/drawing/2014/main" xmlns="" val="20001"/>
                     </a:ext>
                   </a:extLst>
                 </a:gridCol>
                 <a:gridCol w="840172">
                   <a:extLst>
                     <a:ext uri="{9D8B030D-6E8A-4147-A177-3AD203B41FA5}">
-                      <a16:colId xmlns:a16="http://schemas.microsoft.com/office/drawing/2014/main" val="20002"/>
+                      <a16:colId xmlns:a16="http://schemas.microsoft.com/office/drawing/2014/main" xmlns="" val="20002"/>
                     </a:ext>
                   </a:extLst>
                 </a:gridCol>
                 <a:gridCol w="840172">
                   <a:extLst>
                     <a:ext uri="{9D8B030D-6E8A-4147-A177-3AD203B41FA5}">
-                      <a16:colId xmlns:a16="http://schemas.microsoft.com/office/drawing/2014/main" val="20003"/>
+                      <a16:colId xmlns:a16="http://schemas.microsoft.com/office/drawing/2014/main" xmlns="" val="20003"/>
                     </a:ext>
                   </a:extLst>
                 </a:gridCol>
                 <a:gridCol w="840172">
                   <a:extLst>
                     <a:ext uri="{9D8B030D-6E8A-4147-A177-3AD203B41FA5}">
-                      <a16:colId xmlns:a16="http://schemas.microsoft.com/office/drawing/2014/main" val="20004"/>
+                      <a16:colId xmlns:a16="http://schemas.microsoft.com/office/drawing/2014/main" xmlns="" val="20004"/>
                     </a:ext>
                   </a:extLst>
                 </a:gridCol>
                 <a:gridCol w="1468418">
                   <a:extLst>
                     <a:ext uri="{9D8B030D-6E8A-4147-A177-3AD203B41FA5}">
-                      <a16:colId xmlns:a16="http://schemas.microsoft.com/office/drawing/2014/main" val="20005"/>
+                      <a16:colId xmlns:a16="http://schemas.microsoft.com/office/drawing/2014/main" xmlns="" val="20005"/>
                     </a:ext>
                   </a:extLst>
                 </a:gridCol>
@@ -19022,7 +19190,7 @@
                 </a:tc>
                 <a:extLst>
                   <a:ext uri="{0D108BD9-81ED-4DB2-BD59-A6C34878D82A}">
-                    <a16:rowId xmlns:a16="http://schemas.microsoft.com/office/drawing/2014/main" val="10000"/>
+                    <a16:rowId xmlns:a16="http://schemas.microsoft.com/office/drawing/2014/main" xmlns="" val="10000"/>
                   </a:ext>
                 </a:extLst>
               </a:tr>
@@ -19311,7 +19479,7 @@
                 </a:tc>
                 <a:extLst>
                   <a:ext uri="{0D108BD9-81ED-4DB2-BD59-A6C34878D82A}">
-                    <a16:rowId xmlns:a16="http://schemas.microsoft.com/office/drawing/2014/main" val="10001"/>
+                    <a16:rowId xmlns:a16="http://schemas.microsoft.com/office/drawing/2014/main" xmlns="" val="10001"/>
                   </a:ext>
                 </a:extLst>
               </a:tr>
@@ -19755,42 +19923,42 @@
                 <a:gridCol w="840172">
                   <a:extLst>
                     <a:ext uri="{9D8B030D-6E8A-4147-A177-3AD203B41FA5}">
-                      <a16:colId xmlns:a16="http://schemas.microsoft.com/office/drawing/2014/main" val="20000"/>
+                      <a16:colId xmlns:a16="http://schemas.microsoft.com/office/drawing/2014/main" xmlns="" val="20000"/>
                     </a:ext>
                   </a:extLst>
                 </a:gridCol>
                 <a:gridCol w="840172">
                   <a:extLst>
                     <a:ext uri="{9D8B030D-6E8A-4147-A177-3AD203B41FA5}">
-                      <a16:colId xmlns:a16="http://schemas.microsoft.com/office/drawing/2014/main" val="20001"/>
+                      <a16:colId xmlns:a16="http://schemas.microsoft.com/office/drawing/2014/main" xmlns="" val="20001"/>
                     </a:ext>
                   </a:extLst>
                 </a:gridCol>
                 <a:gridCol w="840172">
                   <a:extLst>
                     <a:ext uri="{9D8B030D-6E8A-4147-A177-3AD203B41FA5}">
-                      <a16:colId xmlns:a16="http://schemas.microsoft.com/office/drawing/2014/main" val="20002"/>
+                      <a16:colId xmlns:a16="http://schemas.microsoft.com/office/drawing/2014/main" xmlns="" val="20002"/>
                     </a:ext>
                   </a:extLst>
                 </a:gridCol>
                 <a:gridCol w="840172">
                   <a:extLst>
                     <a:ext uri="{9D8B030D-6E8A-4147-A177-3AD203B41FA5}">
-                      <a16:colId xmlns:a16="http://schemas.microsoft.com/office/drawing/2014/main" val="20003"/>
+                      <a16:colId xmlns:a16="http://schemas.microsoft.com/office/drawing/2014/main" xmlns="" val="20003"/>
                     </a:ext>
                   </a:extLst>
                 </a:gridCol>
                 <a:gridCol w="840172">
                   <a:extLst>
                     <a:ext uri="{9D8B030D-6E8A-4147-A177-3AD203B41FA5}">
-                      <a16:colId xmlns:a16="http://schemas.microsoft.com/office/drawing/2014/main" val="20004"/>
+                      <a16:colId xmlns:a16="http://schemas.microsoft.com/office/drawing/2014/main" xmlns="" val="20004"/>
                     </a:ext>
                   </a:extLst>
                 </a:gridCol>
                 <a:gridCol w="1468418">
                   <a:extLst>
                     <a:ext uri="{9D8B030D-6E8A-4147-A177-3AD203B41FA5}">
-                      <a16:colId xmlns:a16="http://schemas.microsoft.com/office/drawing/2014/main" val="20005"/>
+                      <a16:colId xmlns:a16="http://schemas.microsoft.com/office/drawing/2014/main" xmlns="" val="20005"/>
                     </a:ext>
                   </a:extLst>
                 </a:gridCol>
@@ -20080,7 +20248,7 @@
                 </a:tc>
                 <a:extLst>
                   <a:ext uri="{0D108BD9-81ED-4DB2-BD59-A6C34878D82A}">
-                    <a16:rowId xmlns:a16="http://schemas.microsoft.com/office/drawing/2014/main" val="10000"/>
+                    <a16:rowId xmlns:a16="http://schemas.microsoft.com/office/drawing/2014/main" xmlns="" val="10000"/>
                   </a:ext>
                 </a:extLst>
               </a:tr>
@@ -20369,7 +20537,7 @@
                 </a:tc>
                 <a:extLst>
                   <a:ext uri="{0D108BD9-81ED-4DB2-BD59-A6C34878D82A}">
-                    <a16:rowId xmlns:a16="http://schemas.microsoft.com/office/drawing/2014/main" val="10001"/>
+                    <a16:rowId xmlns:a16="http://schemas.microsoft.com/office/drawing/2014/main" xmlns="" val="10001"/>
                   </a:ext>
                 </a:extLst>
               </a:tr>

</xml_diff>